<commit_message>
appservices presentation ndc oslo 2019
</commit_message>
<xml_diff>
--- a/aspnetcore/slides/14_deployment.pptx
+++ b/aspnetcore/slides/14_deployment.pptx
@@ -283,7 +283,7 @@
               <a:pPr>
                 <a:defRPr/>
               </a:pPr>
-              <a:t>11/6/2018</a:t>
+              <a:t>4/25/2019</a:t>
             </a:fld>
             <a:endParaRPr lang="en-US"/>
           </a:p>
@@ -2741,8 +2741,12 @@
           <a:p>
             <a:pPr defTabSz="914400" eaLnBrk="1" hangingPunct="1"/>
             <a:r>
+              <a:rPr lang="en-US"/>
+              <a:t>dotnet </a:t>
+            </a:r>
+            <a:r>
               <a:rPr lang="en-US" dirty="0"/>
-              <a:t>dnu.exe</a:t>
+              <a:t>publish</a:t>
             </a:r>
           </a:p>
         </p:txBody>

</xml_diff>

<commit_message>
update deployment module for aspnetcore3
</commit_message>
<xml_diff>
--- a/aspnetcore/slides/14_deployment.pptx
+++ b/aspnetcore/slides/14_deployment.pptx
@@ -5,10 +5,10 @@
     <p:sldMasterId id="2147483772" r:id="rId1"/>
   </p:sldMasterIdLst>
   <p:notesMasterIdLst>
-    <p:notesMasterId r:id="rId8"/>
+    <p:notesMasterId r:id="rId9"/>
   </p:notesMasterIdLst>
   <p:handoutMasterIdLst>
-    <p:handoutMasterId r:id="rId9"/>
+    <p:handoutMasterId r:id="rId10"/>
   </p:handoutMasterIdLst>
   <p:sldIdLst>
     <p:sldId id="327" r:id="rId2"/>
@@ -16,7 +16,8 @@
     <p:sldId id="337" r:id="rId4"/>
     <p:sldId id="335" r:id="rId5"/>
     <p:sldId id="336" r:id="rId6"/>
-    <p:sldId id="333" r:id="rId7"/>
+    <p:sldId id="338" r:id="rId7"/>
+    <p:sldId id="333" r:id="rId8"/>
   </p:sldIdLst>
   <p:sldSz cx="9144000" cy="6858000" type="screen4x3"/>
   <p:notesSz cx="7302500" cy="9588500"/>
@@ -155,6 +156,7 @@
             <p14:sldId id="337"/>
             <p14:sldId id="335"/>
             <p14:sldId id="336"/>
+            <p14:sldId id="338"/>
             <p14:sldId id="333"/>
           </p14:sldIdLst>
         </p14:section>
@@ -283,7 +285,7 @@
               <a:pPr>
                 <a:defRPr/>
               </a:pPr>
-              <a:t>4/25/2019</a:t>
+              <a:t>9/6/2019</a:t>
             </a:fld>
             <a:endParaRPr lang="en-US"/>
           </a:p>
@@ -3194,10 +3196,10 @@
       </p:sp>
       <p:pic>
         <p:nvPicPr>
-          <p:cNvPr id="4" name="Picture 3">
+          <p:cNvPr id="7" name="Picture 6">
             <a:extLst>
               <a:ext uri="{FF2B5EF4-FFF2-40B4-BE49-F238E27FC236}">
-                <a16:creationId xmlns:a16="http://schemas.microsoft.com/office/drawing/2014/main" id="{14DE6AC5-8B5E-4B5E-9AF8-6D8DA24661A1}"/>
+                <a16:creationId xmlns:a16="http://schemas.microsoft.com/office/drawing/2014/main" id="{DA8CD3D1-CF7C-4A71-8E5A-9D19C4B94757}"/>
               </a:ext>
             </a:extLst>
           </p:cNvPr>
@@ -3214,8 +3216,8 @@
         </p:blipFill>
         <p:spPr>
           <a:xfrm>
-            <a:off x="533400" y="2971800"/>
-            <a:ext cx="8229600" cy="2220845"/>
+            <a:off x="302485" y="2506933"/>
+            <a:ext cx="8539029" cy="2377534"/>
           </a:xfrm>
           <a:prstGeom prst="rect">
             <a:avLst/>
@@ -3239,6 +3241,235 @@
 </file>
 
 <file path=ppt/slides/slide6.xml><?xml version="1.0" encoding="utf-8"?>
+<p:sld xmlns:a="http://schemas.openxmlformats.org/drawingml/2006/main" xmlns:r="http://schemas.openxmlformats.org/officeDocument/2006/relationships" xmlns:p="http://schemas.openxmlformats.org/presentationml/2006/main">
+  <p:cSld>
+    <p:spTree>
+      <p:nvGrpSpPr>
+        <p:cNvPr id="1" name=""/>
+        <p:cNvGrpSpPr/>
+        <p:nvPr/>
+      </p:nvGrpSpPr>
+      <p:grpSpPr>
+        <a:xfrm>
+          <a:off x="0" y="0"/>
+          <a:ext cx="0" cy="0"/>
+          <a:chOff x="0" y="0"/>
+          <a:chExt cx="0" cy="0"/>
+        </a:xfrm>
+      </p:grpSpPr>
+      <p:sp>
+        <p:nvSpPr>
+          <p:cNvPr id="2" name="Title 1">
+            <a:extLst>
+              <a:ext uri="{FF2B5EF4-FFF2-40B4-BE49-F238E27FC236}">
+                <a16:creationId xmlns:a16="http://schemas.microsoft.com/office/drawing/2014/main" id="{EBD5598A-109E-44A8-B2A4-083139A1E09D}"/>
+              </a:ext>
+            </a:extLst>
+          </p:cNvPr>
+          <p:cNvSpPr>
+            <a:spLocks noGrp="1"/>
+          </p:cNvSpPr>
+          <p:nvPr>
+            <p:ph type="title"/>
+          </p:nvPr>
+        </p:nvSpPr>
+        <p:spPr/>
+        <p:txBody>
+          <a:bodyPr/>
+          <a:lstStyle/>
+          <a:p>
+            <a:r>
+              <a:rPr lang="en-US" dirty="0"/>
+              <a:t>Single File, Trimmed!</a:t>
+            </a:r>
+          </a:p>
+        </p:txBody>
+      </p:sp>
+      <p:sp>
+        <p:nvSpPr>
+          <p:cNvPr id="3" name="Text Placeholder 2">
+            <a:extLst>
+              <a:ext uri="{FF2B5EF4-FFF2-40B4-BE49-F238E27FC236}">
+                <a16:creationId xmlns:a16="http://schemas.microsoft.com/office/drawing/2014/main" id="{5A8A30D4-FF42-44EF-B79E-B7D7891C16F1}"/>
+              </a:ext>
+            </a:extLst>
+          </p:cNvPr>
+          <p:cNvSpPr>
+            <a:spLocks noGrp="1"/>
+          </p:cNvSpPr>
+          <p:nvPr>
+            <p:ph type="body" idx="1"/>
+          </p:nvPr>
+        </p:nvSpPr>
+        <p:spPr/>
+        <p:txBody>
+          <a:bodyPr/>
+          <a:lstStyle/>
+          <a:p>
+            <a:endParaRPr lang="en-US"/>
+          </a:p>
+        </p:txBody>
+      </p:sp>
+      <p:pic>
+        <p:nvPicPr>
+          <p:cNvPr id="4" name="Picture 3">
+            <a:extLst>
+              <a:ext uri="{FF2B5EF4-FFF2-40B4-BE49-F238E27FC236}">
+                <a16:creationId xmlns:a16="http://schemas.microsoft.com/office/drawing/2014/main" id="{FFCB041A-BEC6-4438-8D15-4FC8EF889AFA}"/>
+              </a:ext>
+            </a:extLst>
+          </p:cNvPr>
+          <p:cNvPicPr>
+            <a:picLocks noChangeAspect="1"/>
+          </p:cNvPicPr>
+          <p:nvPr/>
+        </p:nvPicPr>
+        <p:blipFill>
+          <a:blip r:embed="rId2"/>
+          <a:stretch>
+            <a:fillRect/>
+          </a:stretch>
+        </p:blipFill>
+        <p:spPr>
+          <a:xfrm>
+            <a:off x="135794" y="1295400"/>
+            <a:ext cx="8872412" cy="1228749"/>
+          </a:xfrm>
+          <a:prstGeom prst="rect">
+            <a:avLst/>
+          </a:prstGeom>
+        </p:spPr>
+      </p:pic>
+      <p:pic>
+        <p:nvPicPr>
+          <p:cNvPr id="5" name="Picture 4">
+            <a:extLst>
+              <a:ext uri="{FF2B5EF4-FFF2-40B4-BE49-F238E27FC236}">
+                <a16:creationId xmlns:a16="http://schemas.microsoft.com/office/drawing/2014/main" id="{04EC48E2-CC91-4DCE-9D9B-C655D1C8D472}"/>
+              </a:ext>
+            </a:extLst>
+          </p:cNvPr>
+          <p:cNvPicPr>
+            <a:picLocks noChangeAspect="1"/>
+          </p:cNvPicPr>
+          <p:nvPr/>
+        </p:nvPicPr>
+        <p:blipFill>
+          <a:blip r:embed="rId3"/>
+          <a:stretch>
+            <a:fillRect/>
+          </a:stretch>
+        </p:blipFill>
+        <p:spPr>
+          <a:xfrm>
+            <a:off x="2209800" y="2946892"/>
+            <a:ext cx="6355631" cy="2773920"/>
+          </a:xfrm>
+          <a:prstGeom prst="rect">
+            <a:avLst/>
+          </a:prstGeom>
+        </p:spPr>
+      </p:pic>
+    </p:spTree>
+    <p:extLst>
+      <p:ext uri="{BB962C8B-B14F-4D97-AF65-F5344CB8AC3E}">
+        <p14:creationId xmlns:p14="http://schemas.microsoft.com/office/powerpoint/2010/main" val="2587647906"/>
+      </p:ext>
+    </p:extLst>
+  </p:cSld>
+  <p:clrMapOvr>
+    <a:masterClrMapping/>
+  </p:clrMapOvr>
+  <p:transition>
+    <p:fade/>
+  </p:transition>
+  <p:timing>
+    <p:tnLst>
+      <p:par>
+        <p:cTn id="1" dur="indefinite" restart="never" nodeType="tmRoot">
+          <p:childTnLst>
+            <p:seq concurrent="1" nextAc="seek">
+              <p:cTn id="2" dur="indefinite" nodeType="mainSeq">
+                <p:childTnLst>
+                  <p:par>
+                    <p:cTn id="3" fill="hold">
+                      <p:stCondLst>
+                        <p:cond delay="indefinite"/>
+                      </p:stCondLst>
+                      <p:childTnLst>
+                        <p:par>
+                          <p:cTn id="4" fill="hold">
+                            <p:stCondLst>
+                              <p:cond delay="0"/>
+                            </p:stCondLst>
+                            <p:childTnLst>
+                              <p:par>
+                                <p:cTn id="5" presetID="10" presetClass="entr" presetSubtype="0" fill="hold" nodeType="clickEffect">
+                                  <p:stCondLst>
+                                    <p:cond delay="0"/>
+                                  </p:stCondLst>
+                                  <p:childTnLst>
+                                    <p:set>
+                                      <p:cBhvr>
+                                        <p:cTn id="6" dur="1" fill="hold">
+                                          <p:stCondLst>
+                                            <p:cond delay="0"/>
+                                          </p:stCondLst>
+                                        </p:cTn>
+                                        <p:tgtEl>
+                                          <p:spTgt spid="5"/>
+                                        </p:tgtEl>
+                                        <p:attrNameLst>
+                                          <p:attrName>style.visibility</p:attrName>
+                                        </p:attrNameLst>
+                                      </p:cBhvr>
+                                      <p:to>
+                                        <p:strVal val="visible"/>
+                                      </p:to>
+                                    </p:set>
+                                    <p:animEffect transition="in" filter="fade">
+                                      <p:cBhvr>
+                                        <p:cTn id="7" dur="500"/>
+                                        <p:tgtEl>
+                                          <p:spTgt spid="5"/>
+                                        </p:tgtEl>
+                                      </p:cBhvr>
+                                    </p:animEffect>
+                                  </p:childTnLst>
+                                </p:cTn>
+                              </p:par>
+                            </p:childTnLst>
+                          </p:cTn>
+                        </p:par>
+                      </p:childTnLst>
+                    </p:cTn>
+                  </p:par>
+                </p:childTnLst>
+              </p:cTn>
+              <p:prevCondLst>
+                <p:cond evt="onPrev" delay="0">
+                  <p:tgtEl>
+                    <p:sldTgt/>
+                  </p:tgtEl>
+                </p:cond>
+              </p:prevCondLst>
+              <p:nextCondLst>
+                <p:cond evt="onNext" delay="0">
+                  <p:tgtEl>
+                    <p:sldTgt/>
+                  </p:tgtEl>
+                </p:cond>
+              </p:nextCondLst>
+            </p:seq>
+          </p:childTnLst>
+        </p:cTn>
+      </p:par>
+    </p:tnLst>
+  </p:timing>
+</p:sld>
+</file>
+
+<file path=ppt/slides/slide7.xml><?xml version="1.0" encoding="utf-8"?>
 <p:sld xmlns:a="http://schemas.openxmlformats.org/drawingml/2006/main" xmlns:r="http://schemas.openxmlformats.org/officeDocument/2006/relationships" xmlns:p="http://schemas.openxmlformats.org/presentationml/2006/main">
   <p:cSld>
     <p:spTree>

</xml_diff>